<commit_message>
update pptx: correct timings
</commit_message>
<xml_diff>
--- a/Dockerfiles-DockerCompose.pptx
+++ b/Dockerfiles-DockerCompose.pptx
@@ -316,7 +316,7 @@
             <a:fld id="{1D8BD707-D9CF-40AE-B4C6-C98DA3205C09}" type="datetimeFigureOut">
               <a:rPr lang="en-US" smtClean="0"/>
               <a:pPr/>
-              <a:t>11/2/2023</a:t>
+              <a:t>12/21/2023</a:t>
             </a:fld>
             <a:endParaRPr lang="en-US"/>
           </a:p>
@@ -481,7 +481,7 @@
             <a:fld id="{1D8BD707-D9CF-40AE-B4C6-C98DA3205C09}" type="datetimeFigureOut">
               <a:rPr lang="en-US" smtClean="0"/>
               <a:pPr/>
-              <a:t>11/2/2023</a:t>
+              <a:t>12/21/2023</a:t>
             </a:fld>
             <a:endParaRPr lang="en-US"/>
           </a:p>
@@ -656,7 +656,7 @@
             <a:fld id="{1D8BD707-D9CF-40AE-B4C6-C98DA3205C09}" type="datetimeFigureOut">
               <a:rPr lang="en-US" smtClean="0"/>
               <a:pPr/>
-              <a:t>11/2/2023</a:t>
+              <a:t>12/21/2023</a:t>
             </a:fld>
             <a:endParaRPr lang="en-US"/>
           </a:p>
@@ -821,7 +821,7 @@
             <a:fld id="{1D8BD707-D9CF-40AE-B4C6-C98DA3205C09}" type="datetimeFigureOut">
               <a:rPr lang="en-US" smtClean="0"/>
               <a:pPr/>
-              <a:t>11/2/2023</a:t>
+              <a:t>12/21/2023</a:t>
             </a:fld>
             <a:endParaRPr lang="en-US"/>
           </a:p>
@@ -1063,7 +1063,7 @@
             <a:fld id="{1D8BD707-D9CF-40AE-B4C6-C98DA3205C09}" type="datetimeFigureOut">
               <a:rPr lang="en-US" smtClean="0"/>
               <a:pPr/>
-              <a:t>11/2/2023</a:t>
+              <a:t>12/21/2023</a:t>
             </a:fld>
             <a:endParaRPr lang="en-US"/>
           </a:p>
@@ -1345,7 +1345,7 @@
             <a:fld id="{1D8BD707-D9CF-40AE-B4C6-C98DA3205C09}" type="datetimeFigureOut">
               <a:rPr lang="en-US" smtClean="0"/>
               <a:pPr/>
-              <a:t>11/2/2023</a:t>
+              <a:t>12/21/2023</a:t>
             </a:fld>
             <a:endParaRPr lang="en-US"/>
           </a:p>
@@ -1761,7 +1761,7 @@
             <a:fld id="{1D8BD707-D9CF-40AE-B4C6-C98DA3205C09}" type="datetimeFigureOut">
               <a:rPr lang="en-US" smtClean="0"/>
               <a:pPr/>
-              <a:t>11/2/2023</a:t>
+              <a:t>12/21/2023</a:t>
             </a:fld>
             <a:endParaRPr lang="en-US"/>
           </a:p>
@@ -1875,7 +1875,7 @@
             <a:fld id="{1D8BD707-D9CF-40AE-B4C6-C98DA3205C09}" type="datetimeFigureOut">
               <a:rPr lang="en-US" smtClean="0"/>
               <a:pPr/>
-              <a:t>11/2/2023</a:t>
+              <a:t>12/21/2023</a:t>
             </a:fld>
             <a:endParaRPr lang="en-US"/>
           </a:p>
@@ -1967,7 +1967,7 @@
             <a:fld id="{1D8BD707-D9CF-40AE-B4C6-C98DA3205C09}" type="datetimeFigureOut">
               <a:rPr lang="en-US" smtClean="0"/>
               <a:pPr/>
-              <a:t>11/2/2023</a:t>
+              <a:t>12/21/2023</a:t>
             </a:fld>
             <a:endParaRPr lang="en-US"/>
           </a:p>
@@ -2239,7 +2239,7 @@
             <a:fld id="{1D8BD707-D9CF-40AE-B4C6-C98DA3205C09}" type="datetimeFigureOut">
               <a:rPr lang="en-US" smtClean="0"/>
               <a:pPr/>
-              <a:t>11/2/2023</a:t>
+              <a:t>12/21/2023</a:t>
             </a:fld>
             <a:endParaRPr lang="en-US"/>
           </a:p>
@@ -2488,7 +2488,7 @@
             <a:fld id="{1D8BD707-D9CF-40AE-B4C6-C98DA3205C09}" type="datetimeFigureOut">
               <a:rPr lang="en-US" smtClean="0"/>
               <a:pPr/>
-              <a:t>11/2/2023</a:t>
+              <a:t>12/21/2023</a:t>
             </a:fld>
             <a:endParaRPr lang="en-US"/>
           </a:p>
@@ -2696,7 +2696,7 @@
             <a:fld id="{1D8BD707-D9CF-40AE-B4C6-C98DA3205C09}" type="datetimeFigureOut">
               <a:rPr lang="en-US" smtClean="0"/>
               <a:pPr/>
-              <a:t>11/2/2023</a:t>
+              <a:t>12/21/2023</a:t>
             </a:fld>
             <a:endParaRPr lang="en-US"/>
           </a:p>
@@ -3445,7 +3445,18 @@
                 <a:ea typeface="Calibri" panose="020F0502020204030204" pitchFamily="34" charset="0"/>
                 <a:cs typeface="Times New Roman" panose="02020603050405020304" pitchFamily="18" charset="0"/>
               </a:rPr>
-              <a:t>60min</a:t>
+              <a:t>8</a:t>
+            </a:r>
+            <a:r>
+              <a:rPr lang="en-US" sz="3200">
+                <a:solidFill>
+                  <a:schemeClr val="bg1"/>
+                </a:solidFill>
+                <a:latin typeface="Calibri" panose="020F0502020204030204" pitchFamily="34" charset="0"/>
+                <a:ea typeface="Calibri" panose="020F0502020204030204" pitchFamily="34" charset="0"/>
+                <a:cs typeface="Times New Roman" panose="02020603050405020304" pitchFamily="18" charset="0"/>
+              </a:rPr>
+              <a:t>0min</a:t>
             </a:r>
             <a:endParaRPr lang="en-BE" sz="3200" dirty="0">
               <a:solidFill>

</xml_diff>